<commit_message>
Adding to final presentation
</commit_message>
<xml_diff>
--- a/FinalPresentation.pptx
+++ b/FinalPresentation.pptx
@@ -12608,7 +12608,58 @@
           <a:bodyPr/>
           <a:lstStyle/>
           <a:p>
-            <a:endParaRPr lang="en-US"/>
+            <a:r>
+              <a:rPr lang="en-US" dirty="0"/>
+              <a:t>Standard ASL </a:t>
+            </a:r>
+            <a:r>
+              <a:rPr lang="en-US" dirty="0" err="1"/>
+              <a:t>Turtlebot</a:t>
+            </a:r>
+            <a:r>
+              <a:rPr lang="en-US" dirty="0"/>
+              <a:t> equipped w/ </a:t>
+            </a:r>
+            <a:r>
+              <a:rPr lang="en-US" dirty="0" err="1"/>
+              <a:t>Velodyne</a:t>
+            </a:r>
+            <a:r>
+              <a:rPr lang="en-US" dirty="0"/>
+              <a:t> Lidar, NVIDIA Jetson GPU, Camera, Raspberry Pi Controller</a:t>
+            </a:r>
+          </a:p>
+          <a:p>
+            <a:r>
+              <a:rPr lang="en-US" dirty="0" err="1"/>
+              <a:t>Dubins</a:t>
+            </a:r>
+            <a:r>
+              <a:rPr lang="en-US" dirty="0"/>
+              <a:t> motion model</a:t>
+            </a:r>
+          </a:p>
+          <a:p>
+            <a:r>
+              <a:rPr lang="en-US" dirty="0" err="1"/>
+              <a:t>Gmapping</a:t>
+            </a:r>
+            <a:r>
+              <a:rPr lang="en-US" dirty="0"/>
+              <a:t> for SLAM</a:t>
+            </a:r>
+          </a:p>
+          <a:p>
+            <a:r>
+              <a:rPr lang="en-US" dirty="0"/>
+              <a:t>TensorFlow RESNET architecture for object detection</a:t>
+            </a:r>
+          </a:p>
+          <a:p>
+            <a:r>
+              <a:rPr lang="en-US" dirty="0"/>
+              <a:t>A* motion planning</a:t>
+            </a:r>
           </a:p>
         </p:txBody>
       </p:sp>
@@ -12688,10 +12739,56 @@
         </p:nvSpPr>
         <p:spPr/>
         <p:txBody>
-          <a:bodyPr/>
+          <a:bodyPr>
+            <a:normAutofit lnSpcReduction="10000"/>
+          </a:bodyPr>
           <a:lstStyle/>
           <a:p>
-            <a:endParaRPr lang="en-US"/>
+            <a:r>
+              <a:rPr lang="en-US" dirty="0"/>
+              <a:t>1) Initial exploration via tele-operation</a:t>
+            </a:r>
+          </a:p>
+          <a:p>
+            <a:pPr lvl="1"/>
+            <a:r>
+              <a:rPr lang="en-US" dirty="0"/>
+              <a:t>Tried method of fixed waypoints for exploration, but variability in map sensing and odometry causing issues</a:t>
+            </a:r>
+          </a:p>
+          <a:p>
+            <a:r>
+              <a:rPr lang="en-US" dirty="0"/>
+              <a:t>2) Publishing dictionary of detected objects</a:t>
+            </a:r>
+          </a:p>
+          <a:p>
+            <a:pPr lvl="1"/>
+            <a:r>
+              <a:rPr lang="en-US" dirty="0"/>
+              <a:t>RESNET architecture over </a:t>
+            </a:r>
+            <a:r>
+              <a:rPr lang="en-US" dirty="0" err="1"/>
+              <a:t>MobileNets</a:t>
+            </a:r>
+            <a:r>
+              <a:rPr lang="en-US" dirty="0"/>
+              <a:t> – seems to be more robust, but some occasional CUDA out-of-memory warnings</a:t>
+            </a:r>
+          </a:p>
+          <a:p>
+            <a:pPr lvl="1"/>
+            <a:r>
+              <a:rPr lang="en-US" dirty="0"/>
+              <a:t>Detection requires vision at a close distance</a:t>
+            </a:r>
+          </a:p>
+          <a:p>
+            <a:r>
+              <a:rPr lang="en-US" dirty="0"/>
+              <a:t>3) Autonomous navigation to user-requested fruit via A*</a:t>
+            </a:r>
           </a:p>
         </p:txBody>
       </p:sp>
@@ -12774,7 +12871,25 @@
           <a:bodyPr/>
           <a:lstStyle/>
           <a:p>
-            <a:endParaRPr lang="en-US"/>
+            <a:r>
+              <a:rPr lang="en-US" dirty="0"/>
+              <a:t>Markers to show current and target pose</a:t>
+            </a:r>
+          </a:p>
+          <a:p>
+            <a:r>
+              <a:rPr lang="en-US" dirty="0"/>
+              <a:t>Stop sign detection and stopping ????</a:t>
+            </a:r>
+          </a:p>
+          <a:p>
+            <a:r>
+              <a:rPr lang="en-US" dirty="0"/>
+              <a:t>Waypoints for initial environment exploration</a:t>
+            </a:r>
+          </a:p>
+          <a:p>
+            <a:endParaRPr lang="en-US" dirty="0"/>
           </a:p>
         </p:txBody>
       </p:sp>
@@ -12830,7 +12945,7 @@
           <a:lstStyle/>
           <a:p>
             <a:r>
-              <a:rPr lang="en-US"/>
+              <a:rPr lang="en-US" dirty="0"/>
               <a:t>Extra Robot Details</a:t>
             </a:r>
           </a:p>

</xml_diff>